<commit_message>
table of contents updated for PPT
</commit_message>
<xml_diff>
--- a/PPT/identity_and_access_management.pptx
+++ b/PPT/identity_and_access_management.pptx
@@ -7,7 +7,7 @@
   <p:sldIdLst>
     <p:sldId id="256" r:id="rId2"/>
     <p:sldId id="258" r:id="rId3"/>
-    <p:sldId id="257" r:id="rId4"/>
+    <p:sldId id="259" r:id="rId4"/>
   </p:sldIdLst>
   <p:sldSz cx="12192000" cy="6858000"/>
   <p:notesSz cx="6858000" cy="9144000"/>
@@ -263,7 +263,7 @@
           <a:p>
             <a:fld id="{7169126B-25BB-453C-88C4-9A149A838A69}" type="datetimeFigureOut">
               <a:rPr lang="en-IN" smtClean="0"/>
-              <a:t>24-08-2024</a:t>
+              <a:t>02-09-2024</a:t>
             </a:fld>
             <a:endParaRPr lang="en-IN"/>
           </a:p>
@@ -463,7 +463,7 @@
           <a:p>
             <a:fld id="{7169126B-25BB-453C-88C4-9A149A838A69}" type="datetimeFigureOut">
               <a:rPr lang="en-IN" smtClean="0"/>
-              <a:t>24-08-2024</a:t>
+              <a:t>02-09-2024</a:t>
             </a:fld>
             <a:endParaRPr lang="en-IN"/>
           </a:p>
@@ -673,7 +673,7 @@
           <a:p>
             <a:fld id="{7169126B-25BB-453C-88C4-9A149A838A69}" type="datetimeFigureOut">
               <a:rPr lang="en-IN" smtClean="0"/>
-              <a:t>24-08-2024</a:t>
+              <a:t>02-09-2024</a:t>
             </a:fld>
             <a:endParaRPr lang="en-IN"/>
           </a:p>
@@ -873,7 +873,7 @@
           <a:p>
             <a:fld id="{7169126B-25BB-453C-88C4-9A149A838A69}" type="datetimeFigureOut">
               <a:rPr lang="en-IN" smtClean="0"/>
-              <a:t>24-08-2024</a:t>
+              <a:t>02-09-2024</a:t>
             </a:fld>
             <a:endParaRPr lang="en-IN"/>
           </a:p>
@@ -1149,7 +1149,7 @@
           <a:p>
             <a:fld id="{7169126B-25BB-453C-88C4-9A149A838A69}" type="datetimeFigureOut">
               <a:rPr lang="en-IN" smtClean="0"/>
-              <a:t>24-08-2024</a:t>
+              <a:t>02-09-2024</a:t>
             </a:fld>
             <a:endParaRPr lang="en-IN"/>
           </a:p>
@@ -1417,7 +1417,7 @@
           <a:p>
             <a:fld id="{7169126B-25BB-453C-88C4-9A149A838A69}" type="datetimeFigureOut">
               <a:rPr lang="en-IN" smtClean="0"/>
-              <a:t>24-08-2024</a:t>
+              <a:t>02-09-2024</a:t>
             </a:fld>
             <a:endParaRPr lang="en-IN"/>
           </a:p>
@@ -1832,7 +1832,7 @@
           <a:p>
             <a:fld id="{7169126B-25BB-453C-88C4-9A149A838A69}" type="datetimeFigureOut">
               <a:rPr lang="en-IN" smtClean="0"/>
-              <a:t>24-08-2024</a:t>
+              <a:t>02-09-2024</a:t>
             </a:fld>
             <a:endParaRPr lang="en-IN"/>
           </a:p>
@@ -1974,7 +1974,7 @@
           <a:p>
             <a:fld id="{7169126B-25BB-453C-88C4-9A149A838A69}" type="datetimeFigureOut">
               <a:rPr lang="en-IN" smtClean="0"/>
-              <a:t>24-08-2024</a:t>
+              <a:t>02-09-2024</a:t>
             </a:fld>
             <a:endParaRPr lang="en-IN"/>
           </a:p>
@@ -2087,7 +2087,7 @@
           <a:p>
             <a:fld id="{7169126B-25BB-453C-88C4-9A149A838A69}" type="datetimeFigureOut">
               <a:rPr lang="en-IN" smtClean="0"/>
-              <a:t>24-08-2024</a:t>
+              <a:t>02-09-2024</a:t>
             </a:fld>
             <a:endParaRPr lang="en-IN"/>
           </a:p>
@@ -2400,7 +2400,7 @@
           <a:p>
             <a:fld id="{7169126B-25BB-453C-88C4-9A149A838A69}" type="datetimeFigureOut">
               <a:rPr lang="en-IN" smtClean="0"/>
-              <a:t>24-08-2024</a:t>
+              <a:t>02-09-2024</a:t>
             </a:fld>
             <a:endParaRPr lang="en-IN"/>
           </a:p>
@@ -2689,7 +2689,7 @@
           <a:p>
             <a:fld id="{7169126B-25BB-453C-88C4-9A149A838A69}" type="datetimeFigureOut">
               <a:rPr lang="en-IN" smtClean="0"/>
-              <a:t>24-08-2024</a:t>
+              <a:t>02-09-2024</a:t>
             </a:fld>
             <a:endParaRPr lang="en-IN"/>
           </a:p>
@@ -2932,7 +2932,7 @@
           <a:p>
             <a:fld id="{7169126B-25BB-453C-88C4-9A149A838A69}" type="datetimeFigureOut">
               <a:rPr lang="en-IN" smtClean="0"/>
-              <a:t>24-08-2024</a:t>
+              <a:t>02-09-2024</a:t>
             </a:fld>
             <a:endParaRPr lang="en-IN"/>
           </a:p>
@@ -3753,15 +3753,50 @@
           <a:p>
             <a:r>
               <a:rPr lang="en-IN" dirty="0"/>
-              <a:t>A Brief History</a:t>
-            </a:r>
-          </a:p>
-          <a:p>
-            <a:r>
-              <a:rPr lang="en-IN"/>
-              <a:t>Why Federation needed</a:t>
-            </a:r>
-            <a:endParaRPr lang="en-IN" dirty="0"/>
+              <a:t>Evolution of Identity Management</a:t>
+            </a:r>
+          </a:p>
+          <a:p>
+            <a:r>
+              <a:rPr lang="en-IN" dirty="0"/>
+              <a:t>Core Concepts and Terminology</a:t>
+            </a:r>
+          </a:p>
+          <a:p>
+            <a:r>
+              <a:rPr lang="en-IN" dirty="0"/>
+              <a:t>Introduction to Identity Federation</a:t>
+            </a:r>
+          </a:p>
+          <a:p>
+            <a:r>
+              <a:rPr lang="en-IN" dirty="0"/>
+              <a:t>Identity Federation in the Cloud</a:t>
+            </a:r>
+          </a:p>
+          <a:p>
+            <a:r>
+              <a:rPr lang="en-IN" dirty="0"/>
+              <a:t>Identity Federation Protocols</a:t>
+            </a:r>
+          </a:p>
+          <a:p>
+            <a:r>
+              <a:rPr lang="en-IN" dirty="0"/>
+              <a:t>Federation Architecture</a:t>
+            </a:r>
+          </a:p>
+          <a:p>
+            <a:r>
+              <a:rPr lang="en-IN" dirty="0"/>
+              <a:t>Implementing Identity Federation</a:t>
+            </a:r>
+          </a:p>
+          <a:p>
+            <a:r>
+              <a:rPr lang="en-IN" dirty="0"/>
+              <a:t>Conclusion</a:t>
+            </a:r>
           </a:p>
         </p:txBody>
       </p:sp>
@@ -3800,7 +3835,7 @@
           <p:cNvPr id="2" name="Title 1">
             <a:extLst>
               <a:ext uri="{FF2B5EF4-FFF2-40B4-BE49-F238E27FC236}">
-                <a16:creationId xmlns:a16="http://schemas.microsoft.com/office/drawing/2014/main" id="{D43D7984-8EA7-FBBC-19C8-DB558F7E0FE4}"/>
+                <a16:creationId xmlns:a16="http://schemas.microsoft.com/office/drawing/2014/main" id="{397750ED-6FA9-90EE-4156-6AF52105FC70}"/>
               </a:ext>
             </a:extLst>
           </p:cNvPr>
@@ -3818,7 +3853,7 @@
           <a:p>
             <a:r>
               <a:rPr lang="en-IN" dirty="0"/>
-              <a:t>Identity Federation</a:t>
+              <a:t>Evolution of Identity Management</a:t>
             </a:r>
           </a:p>
         </p:txBody>
@@ -3828,7 +3863,7 @@
           <p:cNvPr id="3" name="Content Placeholder 2">
             <a:extLst>
               <a:ext uri="{FF2B5EF4-FFF2-40B4-BE49-F238E27FC236}">
-                <a16:creationId xmlns:a16="http://schemas.microsoft.com/office/drawing/2014/main" id="{7CB69776-6F89-0282-8371-F09433396D0B}"/>
+                <a16:creationId xmlns:a16="http://schemas.microsoft.com/office/drawing/2014/main" id="{DB8CA3EB-B9E3-115E-64EB-8FDFE1CB8E58}"/>
               </a:ext>
             </a:extLst>
           </p:cNvPr>
@@ -3844,14 +3879,14 @@
           <a:bodyPr/>
           <a:lstStyle/>
           <a:p>
-            <a:endParaRPr lang="en-IN" dirty="0"/>
+            <a:endParaRPr lang="en-IN"/>
           </a:p>
         </p:txBody>
       </p:sp>
     </p:spTree>
     <p:extLst>
       <p:ext uri="{BB962C8B-B14F-4D97-AF65-F5344CB8AC3E}">
-        <p14:creationId xmlns:p14="http://schemas.microsoft.com/office/powerpoint/2010/main" val="2636873148"/>
+        <p14:creationId xmlns:p14="http://schemas.microsoft.com/office/powerpoint/2010/main" val="3353448024"/>
       </p:ext>
     </p:extLst>
   </p:cSld>

</xml_diff>